<commit_message>
Added: .NET Core Slide
</commit_message>
<xml_diff>
--- a/Functional Programming with C Sharp and Net Core - 8.16.2017/Functional programming with C Sharp.pptx
+++ b/Functional Programming with C Sharp and Net Core - 8.16.2017/Functional programming with C Sharp.pptx
@@ -8,15 +8,16 @@
     <p:sldId id="256" r:id="rId2"/>
     <p:sldId id="257" r:id="rId3"/>
     <p:sldId id="258" r:id="rId4"/>
-    <p:sldId id="259" r:id="rId5"/>
-    <p:sldId id="264" r:id="rId6"/>
-    <p:sldId id="262" r:id="rId7"/>
-    <p:sldId id="263" r:id="rId8"/>
-    <p:sldId id="266" r:id="rId9"/>
-    <p:sldId id="267" r:id="rId10"/>
-    <p:sldId id="265" r:id="rId11"/>
-    <p:sldId id="260" r:id="rId12"/>
-    <p:sldId id="261" r:id="rId13"/>
+    <p:sldId id="268" r:id="rId5"/>
+    <p:sldId id="259" r:id="rId6"/>
+    <p:sldId id="264" r:id="rId7"/>
+    <p:sldId id="262" r:id="rId8"/>
+    <p:sldId id="263" r:id="rId9"/>
+    <p:sldId id="266" r:id="rId10"/>
+    <p:sldId id="267" r:id="rId11"/>
+    <p:sldId id="265" r:id="rId12"/>
+    <p:sldId id="260" r:id="rId13"/>
+    <p:sldId id="261" r:id="rId14"/>
   </p:sldIdLst>
   <p:sldSz cx="12192000" cy="6858000"/>
   <p:notesSz cx="6858000" cy="9144000"/>
@@ -115,7 +116,16 @@
       </a:defRPr>
     </a:lvl9pPr>
   </p:defaultTextStyle>
+  <p:extLst>
+    <p:ext uri="{EFAFB233-063F-42B5-8137-9DF3F51BA10A}">
+      <p15:sldGuideLst xmlns:p15="http://schemas.microsoft.com/office/powerpoint/2012/main"/>
+    </p:ext>
+  </p:extLst>
 </p:presentation>
+</file>
+
+<file path=ppt/revisionInfo.xml><?xml version="1.0" encoding="utf-8"?>
+<p1510:revInfo xmlns:a="http://schemas.openxmlformats.org/drawingml/2006/main" xmlns:r="http://schemas.openxmlformats.org/officeDocument/2006/relationships" xmlns:p1510="http://schemas.microsoft.com/office/powerpoint/2015/10/main"/>
 </file>
 
 <file path=ppt/slideLayouts/slideLayout1.xml><?xml version="1.0" encoding="utf-8"?>
@@ -175,7 +185,7 @@
           <a:noFill/>
           <a:extLst>
             <a:ext uri="{909E8E84-426E-40dd-AFC4-6F175D3DCCD1}">
-              <a14:hiddenFill xmlns:a14="http://schemas.microsoft.com/office/drawing/2010/main" xmlns="">
+              <a14:hiddenFill xmlns="" xmlns:a14="http://schemas.microsoft.com/office/drawing/2010/main">
                 <a:solidFill>
                   <a:srgbClr val="FFFFFF"/>
                 </a:solidFill>
@@ -234,7 +244,7 @@
             </a:ln>
             <a:extLst>
               <a:ext uri="{91240B29-F687-4f45-9708-019B960494DF}">
-                <a14:hiddenLine xmlns:a14="http://schemas.microsoft.com/office/drawing/2010/main" xmlns="" w="9525">
+                <a14:hiddenLine xmlns="" xmlns:a14="http://schemas.microsoft.com/office/drawing/2010/main" w="9525">
                   <a:solidFill>
                     <a:srgbClr val="000000"/>
                   </a:solidFill>
@@ -324,7 +334,7 @@
             </a:ln>
             <a:extLst>
               <a:ext uri="{91240B29-F687-4f45-9708-019B960494DF}">
-                <a14:hiddenLine xmlns:a14="http://schemas.microsoft.com/office/drawing/2010/main" xmlns="" w="9525">
+                <a14:hiddenLine xmlns="" xmlns:a14="http://schemas.microsoft.com/office/drawing/2010/main" w="9525">
                   <a:solidFill>
                     <a:srgbClr val="000000"/>
                   </a:solidFill>
@@ -414,7 +424,7 @@
             </a:ln>
             <a:extLst>
               <a:ext uri="{91240B29-F687-4f45-9708-019B960494DF}">
-                <a14:hiddenLine xmlns:a14="http://schemas.microsoft.com/office/drawing/2010/main" xmlns="" w="9525">
+                <a14:hiddenLine xmlns="" xmlns:a14="http://schemas.microsoft.com/office/drawing/2010/main" w="9525">
                   <a:solidFill>
                     <a:srgbClr val="000000"/>
                   </a:solidFill>
@@ -448,7 +458,7 @@
             </a:ln>
             <a:extLst>
               <a:ext uri="{91240B29-F687-4f45-9708-019B960494DF}">
-                <a14:hiddenLine xmlns:a14="http://schemas.microsoft.com/office/drawing/2010/main" xmlns="" w="9525">
+                <a14:hiddenLine xmlns="" xmlns:a14="http://schemas.microsoft.com/office/drawing/2010/main" w="9525">
                   <a:solidFill>
                     <a:srgbClr val="000000"/>
                   </a:solidFill>
@@ -538,7 +548,7 @@
             </a:ln>
             <a:extLst>
               <a:ext uri="{91240B29-F687-4f45-9708-019B960494DF}">
-                <a14:hiddenLine xmlns:a14="http://schemas.microsoft.com/office/drawing/2010/main" xmlns="" w="9525">
+                <a14:hiddenLine xmlns="" xmlns:a14="http://schemas.microsoft.com/office/drawing/2010/main" w="9525">
                   <a:solidFill>
                     <a:srgbClr val="000000"/>
                   </a:solidFill>
@@ -600,7 +610,7 @@
             </a:ln>
             <a:extLst>
               <a:ext uri="{91240B29-F687-4f45-9708-019B960494DF}">
-                <a14:hiddenLine xmlns:a14="http://schemas.microsoft.com/office/drawing/2010/main" xmlns="" w="9525">
+                <a14:hiddenLine xmlns="" xmlns:a14="http://schemas.microsoft.com/office/drawing/2010/main" w="9525">
                   <a:solidFill>
                     <a:srgbClr val="000000"/>
                   </a:solidFill>
@@ -662,7 +672,7 @@
             </a:ln>
             <a:extLst>
               <a:ext uri="{91240B29-F687-4f45-9708-019B960494DF}">
-                <a14:hiddenLine xmlns:a14="http://schemas.microsoft.com/office/drawing/2010/main" xmlns="" w="9525">
+                <a14:hiddenLine xmlns="" xmlns:a14="http://schemas.microsoft.com/office/drawing/2010/main" w="9525">
                   <a:solidFill>
                     <a:srgbClr val="000000"/>
                   </a:solidFill>
@@ -752,7 +762,7 @@
             </a:ln>
             <a:extLst>
               <a:ext uri="{91240B29-F687-4f45-9708-019B960494DF}">
-                <a14:hiddenLine xmlns:a14="http://schemas.microsoft.com/office/drawing/2010/main" xmlns="" w="9525">
+                <a14:hiddenLine xmlns="" xmlns:a14="http://schemas.microsoft.com/office/drawing/2010/main" w="9525">
                   <a:solidFill>
                     <a:srgbClr val="000000"/>
                   </a:solidFill>
@@ -814,7 +824,7 @@
             </a:ln>
             <a:extLst>
               <a:ext uri="{91240B29-F687-4f45-9708-019B960494DF}">
-                <a14:hiddenLine xmlns:a14="http://schemas.microsoft.com/office/drawing/2010/main" xmlns="" w="9525">
+                <a14:hiddenLine xmlns="" xmlns:a14="http://schemas.microsoft.com/office/drawing/2010/main" w="9525">
                   <a:solidFill>
                     <a:srgbClr val="000000"/>
                   </a:solidFill>
@@ -876,7 +886,7 @@
             </a:ln>
             <a:extLst>
               <a:ext uri="{91240B29-F687-4f45-9708-019B960494DF}">
-                <a14:hiddenLine xmlns:a14="http://schemas.microsoft.com/office/drawing/2010/main" xmlns="" w="9525">
+                <a14:hiddenLine xmlns="" xmlns:a14="http://schemas.microsoft.com/office/drawing/2010/main" w="9525">
                   <a:solidFill>
                     <a:srgbClr val="000000"/>
                   </a:solidFill>
@@ -966,7 +976,7 @@
             </a:ln>
             <a:extLst>
               <a:ext uri="{91240B29-F687-4f45-9708-019B960494DF}">
-                <a14:hiddenLine xmlns:a14="http://schemas.microsoft.com/office/drawing/2010/main" xmlns="" w="9525">
+                <a14:hiddenLine xmlns="" xmlns:a14="http://schemas.microsoft.com/office/drawing/2010/main" w="9525">
                   <a:solidFill>
                     <a:srgbClr val="000000"/>
                   </a:solidFill>
@@ -1056,7 +1066,7 @@
             </a:ln>
             <a:extLst>
               <a:ext uri="{91240B29-F687-4f45-9708-019B960494DF}">
-                <a14:hiddenLine xmlns:a14="http://schemas.microsoft.com/office/drawing/2010/main" xmlns="" w="9525">
+                <a14:hiddenLine xmlns="" xmlns:a14="http://schemas.microsoft.com/office/drawing/2010/main" w="9525">
                   <a:solidFill>
                     <a:srgbClr val="000000"/>
                   </a:solidFill>
@@ -1118,7 +1128,7 @@
             </a:ln>
             <a:extLst>
               <a:ext uri="{91240B29-F687-4f45-9708-019B960494DF}">
-                <a14:hiddenLine xmlns:a14="http://schemas.microsoft.com/office/drawing/2010/main" xmlns="" w="9525">
+                <a14:hiddenLine xmlns="" xmlns:a14="http://schemas.microsoft.com/office/drawing/2010/main" w="9525">
                   <a:solidFill>
                     <a:srgbClr val="000000"/>
                   </a:solidFill>
@@ -1228,7 +1238,7 @@
             </a:ln>
             <a:extLst>
               <a:ext uri="{91240B29-F687-4f45-9708-019B960494DF}">
-                <a14:hiddenLine xmlns:a14="http://schemas.microsoft.com/office/drawing/2010/main" xmlns="" w="9525">
+                <a14:hiddenLine xmlns="" xmlns:a14="http://schemas.microsoft.com/office/drawing/2010/main" w="9525">
                   <a:solidFill>
                     <a:srgbClr val="000000"/>
                   </a:solidFill>
@@ -1290,7 +1300,7 @@
             </a:ln>
             <a:extLst>
               <a:ext uri="{91240B29-F687-4f45-9708-019B960494DF}">
-                <a14:hiddenLine xmlns:a14="http://schemas.microsoft.com/office/drawing/2010/main" xmlns="" w="9525">
+                <a14:hiddenLine xmlns="" xmlns:a14="http://schemas.microsoft.com/office/drawing/2010/main" w="9525">
                   <a:solidFill>
                     <a:srgbClr val="000000"/>
                   </a:solidFill>
@@ -1380,7 +1390,7 @@
             </a:ln>
             <a:extLst>
               <a:ext uri="{91240B29-F687-4f45-9708-019B960494DF}">
-                <a14:hiddenLine xmlns:a14="http://schemas.microsoft.com/office/drawing/2010/main" xmlns="" w="9525">
+                <a14:hiddenLine xmlns="" xmlns:a14="http://schemas.microsoft.com/office/drawing/2010/main" w="9525">
                   <a:solidFill>
                     <a:srgbClr val="000000"/>
                   </a:solidFill>
@@ -1470,7 +1480,7 @@
             </a:ln>
             <a:extLst>
               <a:ext uri="{91240B29-F687-4f45-9708-019B960494DF}">
-                <a14:hiddenLine xmlns:a14="http://schemas.microsoft.com/office/drawing/2010/main" xmlns="" w="9525">
+                <a14:hiddenLine xmlns="" xmlns:a14="http://schemas.microsoft.com/office/drawing/2010/main" w="9525">
                   <a:solidFill>
                     <a:srgbClr val="000000"/>
                   </a:solidFill>
@@ -1532,7 +1542,7 @@
             </a:ln>
             <a:extLst>
               <a:ext uri="{91240B29-F687-4f45-9708-019B960494DF}">
-                <a14:hiddenLine xmlns:a14="http://schemas.microsoft.com/office/drawing/2010/main" xmlns="" w="9525">
+                <a14:hiddenLine xmlns="" xmlns:a14="http://schemas.microsoft.com/office/drawing/2010/main" w="9525">
                   <a:solidFill>
                     <a:srgbClr val="000000"/>
                   </a:solidFill>
@@ -1622,7 +1632,7 @@
             </a:ln>
             <a:extLst>
               <a:ext uri="{91240B29-F687-4f45-9708-019B960494DF}">
-                <a14:hiddenLine xmlns:a14="http://schemas.microsoft.com/office/drawing/2010/main" xmlns="" w="9525">
+                <a14:hiddenLine xmlns="" xmlns:a14="http://schemas.microsoft.com/office/drawing/2010/main" w="9525">
                   <a:solidFill>
                     <a:srgbClr val="000000"/>
                   </a:solidFill>
@@ -1712,7 +1722,7 @@
             </a:ln>
             <a:extLst>
               <a:ext uri="{91240B29-F687-4f45-9708-019B960494DF}">
-                <a14:hiddenLine xmlns:a14="http://schemas.microsoft.com/office/drawing/2010/main" xmlns="" w="9525">
+                <a14:hiddenLine xmlns="" xmlns:a14="http://schemas.microsoft.com/office/drawing/2010/main" w="9525">
                   <a:solidFill>
                     <a:srgbClr val="000000"/>
                   </a:solidFill>
@@ -1768,7 +1778,7 @@
             </a:ln>
             <a:extLst>
               <a:ext uri="{91240B29-F687-4f45-9708-019B960494DF}">
-                <a14:hiddenLine xmlns:a14="http://schemas.microsoft.com/office/drawing/2010/main" xmlns="" w="9525">
+                <a14:hiddenLine xmlns="" xmlns:a14="http://schemas.microsoft.com/office/drawing/2010/main" w="9525">
                   <a:solidFill>
                     <a:srgbClr val="000000"/>
                   </a:solidFill>
@@ -1858,7 +1868,7 @@
             </a:ln>
             <a:extLst>
               <a:ext uri="{91240B29-F687-4f45-9708-019B960494DF}">
-                <a14:hiddenLine xmlns:a14="http://schemas.microsoft.com/office/drawing/2010/main" xmlns="" w="9525">
+                <a14:hiddenLine xmlns="" xmlns:a14="http://schemas.microsoft.com/office/drawing/2010/main" w="9525">
                   <a:solidFill>
                     <a:srgbClr val="000000"/>
                   </a:solidFill>
@@ -1914,7 +1924,7 @@
             </a:ln>
             <a:extLst>
               <a:ext uri="{91240B29-F687-4f45-9708-019B960494DF}">
-                <a14:hiddenLine xmlns:a14="http://schemas.microsoft.com/office/drawing/2010/main" xmlns="" w="9525">
+                <a14:hiddenLine xmlns="" xmlns:a14="http://schemas.microsoft.com/office/drawing/2010/main" w="9525">
                   <a:solidFill>
                     <a:srgbClr val="000000"/>
                   </a:solidFill>
@@ -2004,7 +2014,7 @@
             </a:ln>
             <a:extLst>
               <a:ext uri="{91240B29-F687-4f45-9708-019B960494DF}">
-                <a14:hiddenLine xmlns:a14="http://schemas.microsoft.com/office/drawing/2010/main" xmlns="" w="9525">
+                <a14:hiddenLine xmlns="" xmlns:a14="http://schemas.microsoft.com/office/drawing/2010/main" w="9525">
                   <a:solidFill>
                     <a:srgbClr val="000000"/>
                   </a:solidFill>
@@ -2072,7 +2082,7 @@
             </a:ln>
             <a:extLst>
               <a:ext uri="{91240B29-F687-4f45-9708-019B960494DF}">
-                <a14:hiddenLine xmlns:a14="http://schemas.microsoft.com/office/drawing/2010/main" xmlns="" w="9525">
+                <a14:hiddenLine xmlns="" xmlns:a14="http://schemas.microsoft.com/office/drawing/2010/main" w="9525">
                   <a:solidFill>
                     <a:srgbClr val="000000"/>
                   </a:solidFill>
@@ -2162,7 +2172,7 @@
             </a:ln>
             <a:extLst>
               <a:ext uri="{91240B29-F687-4f45-9708-019B960494DF}">
-                <a14:hiddenLine xmlns:a14="http://schemas.microsoft.com/office/drawing/2010/main" xmlns="" w="9525">
+                <a14:hiddenLine xmlns="" xmlns:a14="http://schemas.microsoft.com/office/drawing/2010/main" w="9525">
                   <a:solidFill>
                     <a:srgbClr val="000000"/>
                   </a:solidFill>
@@ -2230,7 +2240,7 @@
             </a:ln>
             <a:extLst>
               <a:ext uri="{91240B29-F687-4f45-9708-019B960494DF}">
-                <a14:hiddenLine xmlns:a14="http://schemas.microsoft.com/office/drawing/2010/main" xmlns="" w="9525">
+                <a14:hiddenLine xmlns="" xmlns:a14="http://schemas.microsoft.com/office/drawing/2010/main" w="9525">
                   <a:solidFill>
                     <a:srgbClr val="000000"/>
                   </a:solidFill>
@@ -2320,7 +2330,7 @@
             </a:ln>
             <a:extLst>
               <a:ext uri="{91240B29-F687-4f45-9708-019B960494DF}">
-                <a14:hiddenLine xmlns:a14="http://schemas.microsoft.com/office/drawing/2010/main" xmlns="" w="9525">
+                <a14:hiddenLine xmlns="" xmlns:a14="http://schemas.microsoft.com/office/drawing/2010/main" w="9525">
                   <a:solidFill>
                     <a:srgbClr val="000000"/>
                   </a:solidFill>
@@ -2354,7 +2364,7 @@
             </a:ln>
             <a:extLst>
               <a:ext uri="{91240B29-F687-4f45-9708-019B960494DF}">
-                <a14:hiddenLine xmlns:a14="http://schemas.microsoft.com/office/drawing/2010/main" xmlns="" w="9525">
+                <a14:hiddenLine xmlns="" xmlns:a14="http://schemas.microsoft.com/office/drawing/2010/main" w="9525">
                   <a:solidFill>
                     <a:srgbClr val="000000"/>
                   </a:solidFill>
@@ -2444,7 +2454,7 @@
             </a:ln>
             <a:extLst>
               <a:ext uri="{91240B29-F687-4f45-9708-019B960494DF}">
-                <a14:hiddenLine xmlns:a14="http://schemas.microsoft.com/office/drawing/2010/main" xmlns="" w="9525">
+                <a14:hiddenLine xmlns="" xmlns:a14="http://schemas.microsoft.com/office/drawing/2010/main" w="9525">
                   <a:solidFill>
                     <a:srgbClr val="000000"/>
                   </a:solidFill>
@@ -2506,7 +2516,7 @@
             </a:ln>
             <a:extLst>
               <a:ext uri="{91240B29-F687-4f45-9708-019B960494DF}">
-                <a14:hiddenLine xmlns:a14="http://schemas.microsoft.com/office/drawing/2010/main" xmlns="" w="9525">
+                <a14:hiddenLine xmlns="" xmlns:a14="http://schemas.microsoft.com/office/drawing/2010/main" w="9525">
                   <a:solidFill>
                     <a:srgbClr val="000000"/>
                   </a:solidFill>
@@ -2568,7 +2578,7 @@
             </a:ln>
             <a:extLst>
               <a:ext uri="{91240B29-F687-4f45-9708-019B960494DF}">
-                <a14:hiddenLine xmlns:a14="http://schemas.microsoft.com/office/drawing/2010/main" xmlns="" w="9525">
+                <a14:hiddenLine xmlns="" xmlns:a14="http://schemas.microsoft.com/office/drawing/2010/main" w="9525">
                   <a:solidFill>
                     <a:srgbClr val="000000"/>
                   </a:solidFill>
@@ -2658,7 +2668,7 @@
             </a:ln>
             <a:extLst>
               <a:ext uri="{91240B29-F687-4f45-9708-019B960494DF}">
-                <a14:hiddenLine xmlns:a14="http://schemas.microsoft.com/office/drawing/2010/main" xmlns="" w="9525">
+                <a14:hiddenLine xmlns="" xmlns:a14="http://schemas.microsoft.com/office/drawing/2010/main" w="9525">
                   <a:solidFill>
                     <a:srgbClr val="000000"/>
                   </a:solidFill>
@@ -2726,7 +2736,7 @@
             </a:ln>
             <a:extLst>
               <a:ext uri="{91240B29-F687-4f45-9708-019B960494DF}">
-                <a14:hiddenLine xmlns:a14="http://schemas.microsoft.com/office/drawing/2010/main" xmlns="" w="9525">
+                <a14:hiddenLine xmlns="" xmlns:a14="http://schemas.microsoft.com/office/drawing/2010/main" w="9525">
                   <a:solidFill>
                     <a:srgbClr val="000000"/>
                   </a:solidFill>
@@ -2788,7 +2798,7 @@
             </a:ln>
             <a:extLst>
               <a:ext uri="{91240B29-F687-4f45-9708-019B960494DF}">
-                <a14:hiddenLine xmlns:a14="http://schemas.microsoft.com/office/drawing/2010/main" xmlns="" w="9525">
+                <a14:hiddenLine xmlns="" xmlns:a14="http://schemas.microsoft.com/office/drawing/2010/main" w="9525">
                   <a:solidFill>
                     <a:srgbClr val="000000"/>
                   </a:solidFill>
@@ -2878,7 +2888,7 @@
             </a:ln>
             <a:extLst>
               <a:ext uri="{91240B29-F687-4f45-9708-019B960494DF}">
-                <a14:hiddenLine xmlns:a14="http://schemas.microsoft.com/office/drawing/2010/main" xmlns="" w="9525">
+                <a14:hiddenLine xmlns="" xmlns:a14="http://schemas.microsoft.com/office/drawing/2010/main" w="9525">
                   <a:solidFill>
                     <a:srgbClr val="000000"/>
                   </a:solidFill>
@@ -2940,7 +2950,7 @@
             </a:ln>
             <a:extLst>
               <a:ext uri="{91240B29-F687-4f45-9708-019B960494DF}">
-                <a14:hiddenLine xmlns:a14="http://schemas.microsoft.com/office/drawing/2010/main" xmlns="" w="9525">
+                <a14:hiddenLine xmlns="" xmlns:a14="http://schemas.microsoft.com/office/drawing/2010/main" w="9525">
                   <a:solidFill>
                     <a:srgbClr val="000000"/>
                   </a:solidFill>
@@ -3030,7 +3040,7 @@
             </a:ln>
             <a:extLst>
               <a:ext uri="{91240B29-F687-4f45-9708-019B960494DF}">
-                <a14:hiddenLine xmlns:a14="http://schemas.microsoft.com/office/drawing/2010/main" xmlns="" w="9525">
+                <a14:hiddenLine xmlns="" xmlns:a14="http://schemas.microsoft.com/office/drawing/2010/main" w="9525">
                   <a:solidFill>
                     <a:srgbClr val="000000"/>
                   </a:solidFill>
@@ -3092,7 +3102,7 @@
             </a:ln>
             <a:extLst>
               <a:ext uri="{91240B29-F687-4f45-9708-019B960494DF}">
-                <a14:hiddenLine xmlns:a14="http://schemas.microsoft.com/office/drawing/2010/main" xmlns="" w="9525">
+                <a14:hiddenLine xmlns="" xmlns:a14="http://schemas.microsoft.com/office/drawing/2010/main" w="9525">
                   <a:solidFill>
                     <a:srgbClr val="000000"/>
                   </a:solidFill>
@@ -3182,7 +3192,7 @@
             </a:ln>
             <a:extLst>
               <a:ext uri="{91240B29-F687-4f45-9708-019B960494DF}">
-                <a14:hiddenLine xmlns:a14="http://schemas.microsoft.com/office/drawing/2010/main" xmlns="" w="9525">
+                <a14:hiddenLine xmlns="" xmlns:a14="http://schemas.microsoft.com/office/drawing/2010/main" w="9525">
                   <a:solidFill>
                     <a:srgbClr val="000000"/>
                   </a:solidFill>
@@ -3216,7 +3226,7 @@
             </a:ln>
             <a:extLst>
               <a:ext uri="{91240B29-F687-4f45-9708-019B960494DF}">
-                <a14:hiddenLine xmlns:a14="http://schemas.microsoft.com/office/drawing/2010/main" xmlns="" w="9525">
+                <a14:hiddenLine xmlns="" xmlns:a14="http://schemas.microsoft.com/office/drawing/2010/main" w="9525">
                   <a:solidFill>
                     <a:srgbClr val="000000"/>
                   </a:solidFill>
@@ -3281,7 +3291,7 @@
             </a:ln>
             <a:extLst>
               <a:ext uri="{91240B29-F687-4f45-9708-019B960494DF}">
-                <a14:hiddenLine xmlns:a14="http://schemas.microsoft.com/office/drawing/2010/main" xmlns="" w="9525">
+                <a14:hiddenLine xmlns="" xmlns:a14="http://schemas.microsoft.com/office/drawing/2010/main" w="9525">
                   <a:solidFill>
                     <a:srgbClr val="000000"/>
                   </a:solidFill>
@@ -3371,7 +3381,7 @@
             </a:ln>
             <a:extLst>
               <a:ext uri="{91240B29-F687-4f45-9708-019B960494DF}">
-                <a14:hiddenLine xmlns:a14="http://schemas.microsoft.com/office/drawing/2010/main" xmlns="" w="9525">
+                <a14:hiddenLine xmlns="" xmlns:a14="http://schemas.microsoft.com/office/drawing/2010/main" w="9525">
                   <a:solidFill>
                     <a:srgbClr val="000000"/>
                   </a:solidFill>
@@ -3433,7 +3443,7 @@
             </a:ln>
             <a:extLst>
               <a:ext uri="{91240B29-F687-4f45-9708-019B960494DF}">
-                <a14:hiddenLine xmlns:a14="http://schemas.microsoft.com/office/drawing/2010/main" xmlns="" w="9525">
+                <a14:hiddenLine xmlns="" xmlns:a14="http://schemas.microsoft.com/office/drawing/2010/main" w="9525">
                   <a:solidFill>
                     <a:srgbClr val="000000"/>
                   </a:solidFill>
@@ -3523,7 +3533,7 @@
             </a:ln>
             <a:extLst>
               <a:ext uri="{91240B29-F687-4f45-9708-019B960494DF}">
-                <a14:hiddenLine xmlns:a14="http://schemas.microsoft.com/office/drawing/2010/main" xmlns="" w="9525">
+                <a14:hiddenLine xmlns="" xmlns:a14="http://schemas.microsoft.com/office/drawing/2010/main" w="9525">
                   <a:solidFill>
                     <a:srgbClr val="000000"/>
                   </a:solidFill>
@@ -3613,7 +3623,7 @@
             </a:ln>
             <a:extLst>
               <a:ext uri="{91240B29-F687-4f45-9708-019B960494DF}">
-                <a14:hiddenLine xmlns:a14="http://schemas.microsoft.com/office/drawing/2010/main" xmlns="" w="9525">
+                <a14:hiddenLine xmlns="" xmlns:a14="http://schemas.microsoft.com/office/drawing/2010/main" w="9525">
                   <a:solidFill>
                     <a:srgbClr val="000000"/>
                   </a:solidFill>
@@ -3678,7 +3688,7 @@
             </a:ln>
             <a:extLst>
               <a:ext uri="{91240B29-F687-4f45-9708-019B960494DF}">
-                <a14:hiddenLine xmlns:a14="http://schemas.microsoft.com/office/drawing/2010/main" xmlns="" w="9525">
+                <a14:hiddenLine xmlns="" xmlns:a14="http://schemas.microsoft.com/office/drawing/2010/main" w="9525">
                   <a:solidFill>
                     <a:srgbClr val="000000"/>
                   </a:solidFill>
@@ -3740,7 +3750,7 @@
             </a:ln>
             <a:extLst>
               <a:ext uri="{91240B29-F687-4f45-9708-019B960494DF}">
-                <a14:hiddenLine xmlns:a14="http://schemas.microsoft.com/office/drawing/2010/main" xmlns="" w="9525">
+                <a14:hiddenLine xmlns="" xmlns:a14="http://schemas.microsoft.com/office/drawing/2010/main" w="9525">
                   <a:solidFill>
                     <a:srgbClr val="000000"/>
                   </a:solidFill>
@@ -3830,7 +3840,7 @@
             </a:ln>
             <a:extLst>
               <a:ext uri="{91240B29-F687-4f45-9708-019B960494DF}">
-                <a14:hiddenLine xmlns:a14="http://schemas.microsoft.com/office/drawing/2010/main" xmlns="" w="9525">
+                <a14:hiddenLine xmlns="" xmlns:a14="http://schemas.microsoft.com/office/drawing/2010/main" w="9525">
                   <a:solidFill>
                     <a:srgbClr val="000000"/>
                   </a:solidFill>
@@ -3920,7 +3930,7 @@
             </a:ln>
             <a:extLst>
               <a:ext uri="{91240B29-F687-4f45-9708-019B960494DF}">
-                <a14:hiddenLine xmlns:a14="http://schemas.microsoft.com/office/drawing/2010/main" xmlns="" w="9525">
+                <a14:hiddenLine xmlns="" xmlns:a14="http://schemas.microsoft.com/office/drawing/2010/main" w="9525">
                   <a:solidFill>
                     <a:srgbClr val="000000"/>
                   </a:solidFill>
@@ -3982,7 +3992,7 @@
             </a:ln>
             <a:extLst>
               <a:ext uri="{91240B29-F687-4f45-9708-019B960494DF}">
-                <a14:hiddenLine xmlns:a14="http://schemas.microsoft.com/office/drawing/2010/main" xmlns="" w="9525">
+                <a14:hiddenLine xmlns="" xmlns:a14="http://schemas.microsoft.com/office/drawing/2010/main" w="9525">
                   <a:solidFill>
                     <a:srgbClr val="000000"/>
                   </a:solidFill>
@@ -4102,7 +4112,7 @@
             </a:ln>
             <a:extLst>
               <a:ext uri="{91240B29-F687-4f45-9708-019B960494DF}">
-                <a14:hiddenLine xmlns:a14="http://schemas.microsoft.com/office/drawing/2010/main" xmlns="" w="9525">
+                <a14:hiddenLine xmlns="" xmlns:a14="http://schemas.microsoft.com/office/drawing/2010/main" w="9525">
                   <a:solidFill>
                     <a:srgbClr val="000000"/>
                   </a:solidFill>
@@ -4170,7 +4180,7 @@
             </a:ln>
             <a:extLst>
               <a:ext uri="{91240B29-F687-4f45-9708-019B960494DF}">
-                <a14:hiddenLine xmlns:a14="http://schemas.microsoft.com/office/drawing/2010/main" xmlns="" w="9525">
+                <a14:hiddenLine xmlns="" xmlns:a14="http://schemas.microsoft.com/office/drawing/2010/main" w="9525">
                   <a:solidFill>
                     <a:srgbClr val="000000"/>
                   </a:solidFill>
@@ -4260,7 +4270,7 @@
             </a:ln>
             <a:extLst>
               <a:ext uri="{91240B29-F687-4f45-9708-019B960494DF}">
-                <a14:hiddenLine xmlns:a14="http://schemas.microsoft.com/office/drawing/2010/main" xmlns="" w="9525">
+                <a14:hiddenLine xmlns="" xmlns:a14="http://schemas.microsoft.com/office/drawing/2010/main" w="9525">
                   <a:solidFill>
                     <a:srgbClr val="000000"/>
                   </a:solidFill>
@@ -4400,7 +4410,7 @@
           <a:p>
             <a:fld id="{48A87A34-81AB-432B-8DAE-1953F412C126}" type="datetimeFigureOut">
               <a:rPr lang="en-US" smtClean="0"/>
-              <a:t>8/14/2017</a:t>
+              <a:t>8/16/2017</a:t>
             </a:fld>
             <a:endParaRPr lang="en-US" dirty="0"/>
           </a:p>
@@ -4667,7 +4677,7 @@
           <a:p>
             <a:fld id="{48A87A34-81AB-432B-8DAE-1953F412C126}" type="datetimeFigureOut">
               <a:rPr lang="en-US" smtClean="0"/>
-              <a:t>8/14/2017</a:t>
+              <a:t>8/16/2017</a:t>
             </a:fld>
             <a:endParaRPr lang="en-US" dirty="0"/>
           </a:p>
@@ -4863,7 +4873,7 @@
           <a:p>
             <a:fld id="{48A87A34-81AB-432B-8DAE-1953F412C126}" type="datetimeFigureOut">
               <a:rPr lang="en-US" smtClean="0"/>
-              <a:t>8/14/2017</a:t>
+              <a:t>8/16/2017</a:t>
             </a:fld>
             <a:endParaRPr lang="en-US" dirty="0"/>
           </a:p>
@@ -5126,7 +5136,7 @@
           <a:p>
             <a:fld id="{48A87A34-81AB-432B-8DAE-1953F412C126}" type="datetimeFigureOut">
               <a:rPr lang="en-US" smtClean="0"/>
-              <a:t>8/14/2017</a:t>
+              <a:t>8/16/2017</a:t>
             </a:fld>
             <a:endParaRPr lang="en-US" dirty="0"/>
           </a:p>
@@ -5560,7 +5570,7 @@
           <a:p>
             <a:fld id="{48A87A34-81AB-432B-8DAE-1953F412C126}" type="datetimeFigureOut">
               <a:rPr lang="en-US" smtClean="0"/>
-              <a:t>8/14/2017</a:t>
+              <a:t>8/16/2017</a:t>
             </a:fld>
             <a:endParaRPr lang="en-US" dirty="0"/>
           </a:p>
@@ -6106,7 +6116,7 @@
           <a:p>
             <a:fld id="{48A87A34-81AB-432B-8DAE-1953F412C126}" type="datetimeFigureOut">
               <a:rPr lang="en-US" smtClean="0"/>
-              <a:t>8/14/2017</a:t>
+              <a:t>8/16/2017</a:t>
             </a:fld>
             <a:endParaRPr lang="en-US" dirty="0"/>
           </a:p>
@@ -6826,7 +6836,7 @@
           <a:p>
             <a:fld id="{48A87A34-81AB-432B-8DAE-1953F412C126}" type="datetimeFigureOut">
               <a:rPr lang="en-US" smtClean="0"/>
-              <a:t>8/14/2017</a:t>
+              <a:t>8/16/2017</a:t>
             </a:fld>
             <a:endParaRPr lang="en-US" dirty="0"/>
           </a:p>
@@ -6996,7 +7006,7 @@
           <a:p>
             <a:fld id="{48A87A34-81AB-432B-8DAE-1953F412C126}" type="datetimeFigureOut">
               <a:rPr lang="en-US" smtClean="0"/>
-              <a:t>8/14/2017</a:t>
+              <a:t>8/16/2017</a:t>
             </a:fld>
             <a:endParaRPr lang="en-US" dirty="0"/>
           </a:p>
@@ -7176,7 +7186,7 @@
           <a:p>
             <a:fld id="{48A87A34-81AB-432B-8DAE-1953F412C126}" type="datetimeFigureOut">
               <a:rPr lang="en-US" smtClean="0"/>
-              <a:t>8/14/2017</a:t>
+              <a:t>8/16/2017</a:t>
             </a:fld>
             <a:endParaRPr lang="en-US" dirty="0"/>
           </a:p>
@@ -7346,7 +7356,7 @@
           <a:p>
             <a:fld id="{48A87A34-81AB-432B-8DAE-1953F412C126}" type="datetimeFigureOut">
               <a:rPr lang="en-US" smtClean="0"/>
-              <a:t>8/14/2017</a:t>
+              <a:t>8/16/2017</a:t>
             </a:fld>
             <a:endParaRPr lang="en-US" dirty="0"/>
           </a:p>
@@ -7596,7 +7606,7 @@
           <a:p>
             <a:fld id="{48A87A34-81AB-432B-8DAE-1953F412C126}" type="datetimeFigureOut">
               <a:rPr lang="en-US" smtClean="0"/>
-              <a:t>8/14/2017</a:t>
+              <a:t>8/16/2017</a:t>
             </a:fld>
             <a:endParaRPr lang="en-US" dirty="0"/>
           </a:p>
@@ -7828,7 +7838,7 @@
           <a:p>
             <a:fld id="{48A87A34-81AB-432B-8DAE-1953F412C126}" type="datetimeFigureOut">
               <a:rPr lang="en-US" smtClean="0"/>
-              <a:t>8/14/2017</a:t>
+              <a:t>8/16/2017</a:t>
             </a:fld>
             <a:endParaRPr lang="en-US" dirty="0"/>
           </a:p>
@@ -8209,7 +8219,7 @@
           <a:p>
             <a:fld id="{48A87A34-81AB-432B-8DAE-1953F412C126}" type="datetimeFigureOut">
               <a:rPr lang="en-US" smtClean="0"/>
-              <a:t>8/14/2017</a:t>
+              <a:t>8/16/2017</a:t>
             </a:fld>
             <a:endParaRPr lang="en-US" dirty="0"/>
           </a:p>
@@ -8327,7 +8337,7 @@
           <a:p>
             <a:fld id="{48A87A34-81AB-432B-8DAE-1953F412C126}" type="datetimeFigureOut">
               <a:rPr lang="en-US" smtClean="0"/>
-              <a:t>8/14/2017</a:t>
+              <a:t>8/16/2017</a:t>
             </a:fld>
             <a:endParaRPr lang="en-US" dirty="0"/>
           </a:p>
@@ -8422,7 +8432,7 @@
           <a:p>
             <a:fld id="{48A87A34-81AB-432B-8DAE-1953F412C126}" type="datetimeFigureOut">
               <a:rPr lang="en-US" smtClean="0"/>
-              <a:t>8/14/2017</a:t>
+              <a:t>8/16/2017</a:t>
             </a:fld>
             <a:endParaRPr lang="en-US" dirty="0"/>
           </a:p>
@@ -8671,7 +8681,7 @@
           <a:p>
             <a:fld id="{48A87A34-81AB-432B-8DAE-1953F412C126}" type="datetimeFigureOut">
               <a:rPr lang="en-US" smtClean="0"/>
-              <a:t>8/14/2017</a:t>
+              <a:t>8/16/2017</a:t>
             </a:fld>
             <a:endParaRPr lang="en-US" dirty="0"/>
           </a:p>
@@ -8951,7 +8961,7 @@
           <a:p>
             <a:fld id="{48A87A34-81AB-432B-8DAE-1953F412C126}" type="datetimeFigureOut">
               <a:rPr lang="en-US" smtClean="0"/>
-              <a:t>8/14/2017</a:t>
+              <a:t>8/16/2017</a:t>
             </a:fld>
             <a:endParaRPr lang="en-US" dirty="0"/>
           </a:p>
@@ -9074,7 +9084,7 @@
           <a:noFill/>
           <a:extLst>
             <a:ext uri="{909E8E84-426E-40dd-AFC4-6F175D3DCCD1}">
-              <a14:hiddenFill xmlns:a14="http://schemas.microsoft.com/office/drawing/2010/main" xmlns="">
+              <a14:hiddenFill xmlns="" xmlns:a14="http://schemas.microsoft.com/office/drawing/2010/main">
                 <a:solidFill>
                   <a:srgbClr val="FFFFFF"/>
                 </a:solidFill>
@@ -9148,7 +9158,7 @@
               </a:ln>
               <a:extLst>
                 <a:ext uri="{91240B29-F687-4f45-9708-019B960494DF}">
-                  <a14:hiddenLine xmlns:a14="http://schemas.microsoft.com/office/drawing/2010/main" xmlns="" w="9525">
+                  <a14:hiddenLine xmlns="" xmlns:a14="http://schemas.microsoft.com/office/drawing/2010/main" w="9525">
                     <a:solidFill>
                       <a:srgbClr val="000000"/>
                     </a:solidFill>
@@ -9238,7 +9248,7 @@
               </a:ln>
               <a:extLst>
                 <a:ext uri="{91240B29-F687-4f45-9708-019B960494DF}">
-                  <a14:hiddenLine xmlns:a14="http://schemas.microsoft.com/office/drawing/2010/main" xmlns="" w="9525">
+                  <a14:hiddenLine xmlns="" xmlns:a14="http://schemas.microsoft.com/office/drawing/2010/main" w="9525">
                     <a:solidFill>
                       <a:srgbClr val="000000"/>
                     </a:solidFill>
@@ -9328,7 +9338,7 @@
               </a:ln>
               <a:extLst>
                 <a:ext uri="{91240B29-F687-4f45-9708-019B960494DF}">
-                  <a14:hiddenLine xmlns:a14="http://schemas.microsoft.com/office/drawing/2010/main" xmlns="" w="9525">
+                  <a14:hiddenLine xmlns="" xmlns:a14="http://schemas.microsoft.com/office/drawing/2010/main" w="9525">
                     <a:solidFill>
                       <a:srgbClr val="000000"/>
                     </a:solidFill>
@@ -9390,7 +9400,7 @@
               </a:ln>
               <a:extLst>
                 <a:ext uri="{91240B29-F687-4f45-9708-019B960494DF}">
-                  <a14:hiddenLine xmlns:a14="http://schemas.microsoft.com/office/drawing/2010/main" xmlns="" w="9525">
+                  <a14:hiddenLine xmlns="" xmlns:a14="http://schemas.microsoft.com/office/drawing/2010/main" w="9525">
                     <a:solidFill>
                       <a:srgbClr val="000000"/>
                     </a:solidFill>
@@ -9480,7 +9490,7 @@
               </a:ln>
               <a:extLst>
                 <a:ext uri="{91240B29-F687-4f45-9708-019B960494DF}">
-                  <a14:hiddenLine xmlns:a14="http://schemas.microsoft.com/office/drawing/2010/main" xmlns="" w="9525">
+                  <a14:hiddenLine xmlns="" xmlns:a14="http://schemas.microsoft.com/office/drawing/2010/main" w="9525">
                     <a:solidFill>
                       <a:srgbClr val="000000"/>
                     </a:solidFill>
@@ -9542,7 +9552,7 @@
               </a:ln>
               <a:extLst>
                 <a:ext uri="{91240B29-F687-4f45-9708-019B960494DF}">
-                  <a14:hiddenLine xmlns:a14="http://schemas.microsoft.com/office/drawing/2010/main" xmlns="" w="9525">
+                  <a14:hiddenLine xmlns="" xmlns:a14="http://schemas.microsoft.com/office/drawing/2010/main" w="9525">
                     <a:solidFill>
                       <a:srgbClr val="000000"/>
                     </a:solidFill>
@@ -9604,7 +9614,7 @@
               </a:ln>
               <a:extLst>
                 <a:ext uri="{91240B29-F687-4f45-9708-019B960494DF}">
-                  <a14:hiddenLine xmlns:a14="http://schemas.microsoft.com/office/drawing/2010/main" xmlns="" w="9525">
+                  <a14:hiddenLine xmlns="" xmlns:a14="http://schemas.microsoft.com/office/drawing/2010/main" w="9525">
                     <a:solidFill>
                       <a:srgbClr val="000000"/>
                     </a:solidFill>
@@ -9694,7 +9704,7 @@
               </a:ln>
               <a:extLst>
                 <a:ext uri="{91240B29-F687-4f45-9708-019B960494DF}">
-                  <a14:hiddenLine xmlns:a14="http://schemas.microsoft.com/office/drawing/2010/main" xmlns="" w="9525">
+                  <a14:hiddenLine xmlns="" xmlns:a14="http://schemas.microsoft.com/office/drawing/2010/main" w="9525">
                     <a:solidFill>
                       <a:srgbClr val="000000"/>
                     </a:solidFill>
@@ -9784,7 +9794,7 @@
               </a:ln>
               <a:extLst>
                 <a:ext uri="{91240B29-F687-4f45-9708-019B960494DF}">
-                  <a14:hiddenLine xmlns:a14="http://schemas.microsoft.com/office/drawing/2010/main" xmlns="" w="9525">
+                  <a14:hiddenLine xmlns="" xmlns:a14="http://schemas.microsoft.com/office/drawing/2010/main" w="9525">
                     <a:solidFill>
                       <a:srgbClr val="000000"/>
                     </a:solidFill>
@@ -9846,7 +9856,7 @@
               </a:ln>
               <a:extLst>
                 <a:ext uri="{91240B29-F687-4f45-9708-019B960494DF}">
-                  <a14:hiddenLine xmlns:a14="http://schemas.microsoft.com/office/drawing/2010/main" xmlns="" w="9525">
+                  <a14:hiddenLine xmlns="" xmlns:a14="http://schemas.microsoft.com/office/drawing/2010/main" w="9525">
                     <a:solidFill>
                       <a:srgbClr val="000000"/>
                     </a:solidFill>
@@ -9956,7 +9966,7 @@
               </a:ln>
               <a:extLst>
                 <a:ext uri="{91240B29-F687-4f45-9708-019B960494DF}">
-                  <a14:hiddenLine xmlns:a14="http://schemas.microsoft.com/office/drawing/2010/main" xmlns="" w="9525">
+                  <a14:hiddenLine xmlns="" xmlns:a14="http://schemas.microsoft.com/office/drawing/2010/main" w="9525">
                     <a:solidFill>
                       <a:srgbClr val="000000"/>
                     </a:solidFill>
@@ -10040,7 +10050,7 @@
               </a:ln>
               <a:extLst>
                 <a:ext uri="{91240B29-F687-4f45-9708-019B960494DF}">
-                  <a14:hiddenLine xmlns:a14="http://schemas.microsoft.com/office/drawing/2010/main" xmlns="" w="9525">
+                  <a14:hiddenLine xmlns="" xmlns:a14="http://schemas.microsoft.com/office/drawing/2010/main" w="9525">
                     <a:solidFill>
                       <a:srgbClr val="000000"/>
                     </a:solidFill>
@@ -10102,7 +10112,7 @@
               </a:ln>
               <a:extLst>
                 <a:ext uri="{91240B29-F687-4f45-9708-019B960494DF}">
-                  <a14:hiddenLine xmlns:a14="http://schemas.microsoft.com/office/drawing/2010/main" xmlns="" w="9525">
+                  <a14:hiddenLine xmlns="" xmlns:a14="http://schemas.microsoft.com/office/drawing/2010/main" w="9525">
                     <a:solidFill>
                       <a:srgbClr val="000000"/>
                     </a:solidFill>
@@ -10164,7 +10174,7 @@
               </a:ln>
               <a:extLst>
                 <a:ext uri="{91240B29-F687-4f45-9708-019B960494DF}">
-                  <a14:hiddenLine xmlns:a14="http://schemas.microsoft.com/office/drawing/2010/main" xmlns="" w="9525">
+                  <a14:hiddenLine xmlns="" xmlns:a14="http://schemas.microsoft.com/office/drawing/2010/main" w="9525">
                     <a:solidFill>
                       <a:srgbClr val="000000"/>
                     </a:solidFill>
@@ -10254,7 +10264,7 @@
               </a:ln>
               <a:extLst>
                 <a:ext uri="{91240B29-F687-4f45-9708-019B960494DF}">
-                  <a14:hiddenLine xmlns:a14="http://schemas.microsoft.com/office/drawing/2010/main" xmlns="" w="9525">
+                  <a14:hiddenLine xmlns="" xmlns:a14="http://schemas.microsoft.com/office/drawing/2010/main" w="9525">
                     <a:solidFill>
                       <a:srgbClr val="000000"/>
                     </a:solidFill>
@@ -10288,7 +10298,7 @@
               </a:ln>
               <a:extLst>
                 <a:ext uri="{91240B29-F687-4f45-9708-019B960494DF}">
-                  <a14:hiddenLine xmlns:a14="http://schemas.microsoft.com/office/drawing/2010/main" xmlns="" w="9525">
+                  <a14:hiddenLine xmlns="" xmlns:a14="http://schemas.microsoft.com/office/drawing/2010/main" w="9525">
                     <a:solidFill>
                       <a:srgbClr val="000000"/>
                     </a:solidFill>
@@ -10353,7 +10363,7 @@
               </a:ln>
               <a:extLst>
                 <a:ext uri="{91240B29-F687-4f45-9708-019B960494DF}">
-                  <a14:hiddenLine xmlns:a14="http://schemas.microsoft.com/office/drawing/2010/main" xmlns="" w="9525">
+                  <a14:hiddenLine xmlns="" xmlns:a14="http://schemas.microsoft.com/office/drawing/2010/main" w="9525">
                     <a:solidFill>
                       <a:srgbClr val="000000"/>
                     </a:solidFill>
@@ -10443,7 +10453,7 @@
               </a:ln>
               <a:extLst>
                 <a:ext uri="{91240B29-F687-4f45-9708-019B960494DF}">
-                  <a14:hiddenLine xmlns:a14="http://schemas.microsoft.com/office/drawing/2010/main" xmlns="" w="9525">
+                  <a14:hiddenLine xmlns="" xmlns:a14="http://schemas.microsoft.com/office/drawing/2010/main" w="9525">
                     <a:solidFill>
                       <a:srgbClr val="000000"/>
                     </a:solidFill>
@@ -10505,7 +10515,7 @@
               </a:ln>
               <a:extLst>
                 <a:ext uri="{91240B29-F687-4f45-9708-019B960494DF}">
-                  <a14:hiddenLine xmlns:a14="http://schemas.microsoft.com/office/drawing/2010/main" xmlns="" w="9525">
+                  <a14:hiddenLine xmlns="" xmlns:a14="http://schemas.microsoft.com/office/drawing/2010/main" w="9525">
                     <a:solidFill>
                       <a:srgbClr val="000000"/>
                     </a:solidFill>
@@ -10595,7 +10605,7 @@
               </a:ln>
               <a:extLst>
                 <a:ext uri="{91240B29-F687-4f45-9708-019B960494DF}">
-                  <a14:hiddenLine xmlns:a14="http://schemas.microsoft.com/office/drawing/2010/main" xmlns="" w="9525">
+                  <a14:hiddenLine xmlns="" xmlns:a14="http://schemas.microsoft.com/office/drawing/2010/main" w="9525">
                     <a:solidFill>
                       <a:srgbClr val="000000"/>
                     </a:solidFill>
@@ -10660,7 +10670,7 @@
               </a:ln>
               <a:extLst>
                 <a:ext uri="{91240B29-F687-4f45-9708-019B960494DF}">
-                  <a14:hiddenLine xmlns:a14="http://schemas.microsoft.com/office/drawing/2010/main" xmlns="" w="9525">
+                  <a14:hiddenLine xmlns="" xmlns:a14="http://schemas.microsoft.com/office/drawing/2010/main" w="9525">
                     <a:solidFill>
                       <a:srgbClr val="000000"/>
                     </a:solidFill>
@@ -10722,7 +10732,7 @@
               </a:ln>
               <a:extLst>
                 <a:ext uri="{91240B29-F687-4f45-9708-019B960494DF}">
-                  <a14:hiddenLine xmlns:a14="http://schemas.microsoft.com/office/drawing/2010/main" xmlns="" w="9525">
+                  <a14:hiddenLine xmlns="" xmlns:a14="http://schemas.microsoft.com/office/drawing/2010/main" w="9525">
                     <a:solidFill>
                       <a:srgbClr val="000000"/>
                     </a:solidFill>
@@ -10812,7 +10822,7 @@
               </a:ln>
               <a:extLst>
                 <a:ext uri="{91240B29-F687-4f45-9708-019B960494DF}">
-                  <a14:hiddenLine xmlns:a14="http://schemas.microsoft.com/office/drawing/2010/main" xmlns="" w="9525">
+                  <a14:hiddenLine xmlns="" xmlns:a14="http://schemas.microsoft.com/office/drawing/2010/main" w="9525">
                     <a:solidFill>
                       <a:srgbClr val="000000"/>
                     </a:solidFill>
@@ -10902,7 +10912,7 @@
               </a:ln>
               <a:extLst>
                 <a:ext uri="{91240B29-F687-4f45-9708-019B960494DF}">
-                  <a14:hiddenLine xmlns:a14="http://schemas.microsoft.com/office/drawing/2010/main" xmlns="" w="9525">
+                  <a14:hiddenLine xmlns="" xmlns:a14="http://schemas.microsoft.com/office/drawing/2010/main" w="9525">
                     <a:solidFill>
                       <a:srgbClr val="000000"/>
                     </a:solidFill>
@@ -10967,7 +10977,7 @@
               </a:ln>
               <a:extLst>
                 <a:ext uri="{91240B29-F687-4f45-9708-019B960494DF}">
-                  <a14:hiddenLine xmlns:a14="http://schemas.microsoft.com/office/drawing/2010/main" xmlns="" w="9525">
+                  <a14:hiddenLine xmlns="" xmlns:a14="http://schemas.microsoft.com/office/drawing/2010/main" w="9525">
                     <a:solidFill>
                       <a:srgbClr val="000000"/>
                     </a:solidFill>
@@ -11087,7 +11097,7 @@
               </a:ln>
               <a:extLst>
                 <a:ext uri="{91240B29-F687-4f45-9708-019B960494DF}">
-                  <a14:hiddenLine xmlns:a14="http://schemas.microsoft.com/office/drawing/2010/main" xmlns="" w="9525">
+                  <a14:hiddenLine xmlns="" xmlns:a14="http://schemas.microsoft.com/office/drawing/2010/main" w="9525">
                     <a:solidFill>
                       <a:srgbClr val="000000"/>
                     </a:solidFill>
@@ -11168,7 +11178,7 @@
               </a:ln>
               <a:extLst>
                 <a:ext uri="{91240B29-F687-4f45-9708-019B960494DF}">
-                  <a14:hiddenLine xmlns:a14="http://schemas.microsoft.com/office/drawing/2010/main" xmlns="" w="9525">
+                  <a14:hiddenLine xmlns="" xmlns:a14="http://schemas.microsoft.com/office/drawing/2010/main" w="9525">
                     <a:solidFill>
                       <a:srgbClr val="000000"/>
                     </a:solidFill>
@@ -11283,7 +11293,7 @@
               </a:ln>
               <a:extLst>
                 <a:ext uri="{91240B29-F687-4f45-9708-019B960494DF}">
-                  <a14:hiddenLine xmlns:a14="http://schemas.microsoft.com/office/drawing/2010/main" xmlns="" w="9525">
+                  <a14:hiddenLine xmlns="" xmlns:a14="http://schemas.microsoft.com/office/drawing/2010/main" w="9525">
                     <a:solidFill>
                       <a:srgbClr val="000000"/>
                     </a:solidFill>
@@ -11373,7 +11383,7 @@
               </a:ln>
               <a:extLst>
                 <a:ext uri="{91240B29-F687-4f45-9708-019B960494DF}">
-                  <a14:hiddenLine xmlns:a14="http://schemas.microsoft.com/office/drawing/2010/main" xmlns="" w="9525">
+                  <a14:hiddenLine xmlns="" xmlns:a14="http://schemas.microsoft.com/office/drawing/2010/main" w="9525">
                     <a:solidFill>
                       <a:srgbClr val="000000"/>
                     </a:solidFill>
@@ -11438,7 +11448,7 @@
               </a:ln>
               <a:extLst>
                 <a:ext uri="{91240B29-F687-4f45-9708-019B960494DF}">
-                  <a14:hiddenLine xmlns:a14="http://schemas.microsoft.com/office/drawing/2010/main" xmlns="" w="9525">
+                  <a14:hiddenLine xmlns="" xmlns:a14="http://schemas.microsoft.com/office/drawing/2010/main" w="9525">
                     <a:solidFill>
                       <a:srgbClr val="000000"/>
                     </a:solidFill>
@@ -11528,7 +11538,7 @@
               </a:ln>
               <a:extLst>
                 <a:ext uri="{91240B29-F687-4f45-9708-019B960494DF}">
-                  <a14:hiddenLine xmlns:a14="http://schemas.microsoft.com/office/drawing/2010/main" xmlns="" w="9525">
+                  <a14:hiddenLine xmlns="" xmlns:a14="http://schemas.microsoft.com/office/drawing/2010/main" w="9525">
                     <a:solidFill>
                       <a:srgbClr val="000000"/>
                     </a:solidFill>
@@ -11596,7 +11606,7 @@
               </a:ln>
               <a:extLst>
                 <a:ext uri="{91240B29-F687-4f45-9708-019B960494DF}">
-                  <a14:hiddenLine xmlns:a14="http://schemas.microsoft.com/office/drawing/2010/main" xmlns="" w="9525">
+                  <a14:hiddenLine xmlns="" xmlns:a14="http://schemas.microsoft.com/office/drawing/2010/main" w="9525">
                     <a:solidFill>
                       <a:srgbClr val="000000"/>
                     </a:solidFill>
@@ -11686,7 +11696,7 @@
               </a:ln>
               <a:extLst>
                 <a:ext uri="{91240B29-F687-4f45-9708-019B960494DF}">
-                  <a14:hiddenLine xmlns:a14="http://schemas.microsoft.com/office/drawing/2010/main" xmlns="" w="9525">
+                  <a14:hiddenLine xmlns="" xmlns:a14="http://schemas.microsoft.com/office/drawing/2010/main" w="9525">
                     <a:solidFill>
                       <a:srgbClr val="000000"/>
                     </a:solidFill>
@@ -11754,7 +11764,7 @@
               </a:ln>
               <a:extLst>
                 <a:ext uri="{91240B29-F687-4f45-9708-019B960494DF}">
-                  <a14:hiddenLine xmlns:a14="http://schemas.microsoft.com/office/drawing/2010/main" xmlns="" w="9525">
+                  <a14:hiddenLine xmlns="" xmlns:a14="http://schemas.microsoft.com/office/drawing/2010/main" w="9525">
                     <a:solidFill>
                       <a:srgbClr val="000000"/>
                     </a:solidFill>
@@ -11844,7 +11854,7 @@
               </a:ln>
               <a:extLst>
                 <a:ext uri="{91240B29-F687-4f45-9708-019B960494DF}">
-                  <a14:hiddenLine xmlns:a14="http://schemas.microsoft.com/office/drawing/2010/main" xmlns="" w="9525">
+                  <a14:hiddenLine xmlns="" xmlns:a14="http://schemas.microsoft.com/office/drawing/2010/main" w="9525">
                     <a:solidFill>
                       <a:srgbClr val="000000"/>
                     </a:solidFill>
@@ -11878,7 +11888,7 @@
               </a:ln>
               <a:extLst>
                 <a:ext uri="{91240B29-F687-4f45-9708-019B960494DF}">
-                  <a14:hiddenLine xmlns:a14="http://schemas.microsoft.com/office/drawing/2010/main" xmlns="" w="9525">
+                  <a14:hiddenLine xmlns="" xmlns:a14="http://schemas.microsoft.com/office/drawing/2010/main" w="9525">
                     <a:solidFill>
                       <a:srgbClr val="000000"/>
                     </a:solidFill>
@@ -12019,7 +12029,7 @@
             <a:fld id="{48A87A34-81AB-432B-8DAE-1953F412C126}" type="datetimeFigureOut">
               <a:rPr lang="en-US" smtClean="0"/>
               <a:pPr/>
-              <a:t>8/14/2017</a:t>
+              <a:t>8/16/2017</a:t>
             </a:fld>
             <a:endParaRPr lang="en-US" dirty="0"/>
           </a:p>
@@ -12531,6 +12541,171 @@
           <p:cNvPr id="2" name="Title 1">
             <a:extLst>
               <a:ext uri="{FF2B5EF4-FFF2-40B4-BE49-F238E27FC236}">
+                <a16:creationId xmlns:a16="http://schemas.microsoft.com/office/drawing/2014/main" id="{8B80F38C-6943-40B9-BF2F-D669E11FB010}"/>
+              </a:ext>
+            </a:extLst>
+          </p:cNvPr>
+          <p:cNvSpPr>
+            <a:spLocks noGrp="1"/>
+          </p:cNvSpPr>
+          <p:nvPr>
+            <p:ph type="title"/>
+          </p:nvPr>
+        </p:nvSpPr>
+        <p:spPr/>
+        <p:txBody>
+          <a:bodyPr/>
+          <a:lstStyle/>
+          <a:p>
+            <a:r>
+              <a:rPr lang="en-US" dirty="0"/>
+              <a:t>Functions as parameters</a:t>
+            </a:r>
+          </a:p>
+        </p:txBody>
+      </p:sp>
+      <p:sp>
+        <p:nvSpPr>
+          <p:cNvPr id="3" name="Content Placeholder 2">
+            <a:extLst>
+              <a:ext uri="{FF2B5EF4-FFF2-40B4-BE49-F238E27FC236}">
+                <a16:creationId xmlns:a16="http://schemas.microsoft.com/office/drawing/2014/main" id="{33232CF6-83D9-4844-8C9B-7B12E226CD5C}"/>
+              </a:ext>
+            </a:extLst>
+          </p:cNvPr>
+          <p:cNvSpPr>
+            <a:spLocks noGrp="1"/>
+          </p:cNvSpPr>
+          <p:nvPr>
+            <p:ph idx="1"/>
+          </p:nvPr>
+        </p:nvSpPr>
+        <p:spPr/>
+        <p:txBody>
+          <a:bodyPr/>
+          <a:lstStyle/>
+          <a:p>
+            <a:r>
+              <a:rPr lang="en-US" dirty="0"/>
+              <a:t>Utilized with Extension Methods promotes code reuse and readability</a:t>
+            </a:r>
+          </a:p>
+          <a:p>
+            <a:r>
+              <a:rPr lang="en-US" dirty="0"/>
+              <a:t>Example:</a:t>
+            </a:r>
+          </a:p>
+          <a:p>
+            <a:pPr marL="457200" lvl="1" indent="0">
+              <a:buNone/>
+            </a:pPr>
+            <a:r>
+              <a:rPr lang="en-US" dirty="0"/>
+              <a:t>public static bool </a:t>
+            </a:r>
+            <a:r>
+              <a:rPr lang="en-US" dirty="0" err="1"/>
+              <a:t>IsTrue</a:t>
+            </a:r>
+            <a:r>
+              <a:rPr lang="en-US" dirty="0"/>
+              <a:t>&lt;T&gt;(this T </a:t>
+            </a:r>
+            <a:r>
+              <a:rPr lang="en-US" dirty="0" err="1"/>
+              <a:t>genericObject</a:t>
+            </a:r>
+            <a:r>
+              <a:rPr lang="en-US" dirty="0"/>
+              <a:t>, Predicate&lt;T&gt; condition) =&gt; condition(</a:t>
+            </a:r>
+            <a:r>
+              <a:rPr lang="en-US" dirty="0" err="1"/>
+              <a:t>genericObject</a:t>
+            </a:r>
+            <a:r>
+              <a:rPr lang="en-US" dirty="0"/>
+              <a:t>);</a:t>
+            </a:r>
+          </a:p>
+          <a:p>
+            <a:pPr marL="457200" lvl="1" indent="0">
+              <a:buNone/>
+            </a:pPr>
+            <a:endParaRPr lang="en-US" dirty="0"/>
+          </a:p>
+          <a:p>
+            <a:pPr marL="457200" lvl="1" indent="0">
+              <a:buNone/>
+            </a:pPr>
+            <a:r>
+              <a:rPr lang="en-US" dirty="0" err="1"/>
+              <a:t>var</a:t>
+            </a:r>
+            <a:r>
+              <a:rPr lang="en-US" dirty="0"/>
+              <a:t> person = new Person(name: “John”, age: 32);</a:t>
+            </a:r>
+          </a:p>
+          <a:p>
+            <a:pPr marL="457200" lvl="1" indent="0">
+              <a:buNone/>
+            </a:pPr>
+            <a:r>
+              <a:rPr lang="en-US" dirty="0" err="1"/>
+              <a:t>person.IsTrue</a:t>
+            </a:r>
+            <a:r>
+              <a:rPr lang="en-US" dirty="0"/>
+              <a:t>(a =&gt; </a:t>
+            </a:r>
+            <a:r>
+              <a:rPr lang="en-US" dirty="0" err="1"/>
+              <a:t>a.Age</a:t>
+            </a:r>
+            <a:r>
+              <a:rPr lang="en-US" dirty="0"/>
+              <a:t> &gt; 50); </a:t>
+            </a:r>
+          </a:p>
+        </p:txBody>
+      </p:sp>
+    </p:spTree>
+    <p:extLst>
+      <p:ext uri="{BB962C8B-B14F-4D97-AF65-F5344CB8AC3E}">
+        <p14:creationId xmlns:p14="http://schemas.microsoft.com/office/powerpoint/2010/main" val="4017039949"/>
+      </p:ext>
+    </p:extLst>
+  </p:cSld>
+  <p:clrMapOvr>
+    <a:masterClrMapping/>
+  </p:clrMapOvr>
+</p:sld>
+</file>
+
+<file path=ppt/slides/slide11.xml><?xml version="1.0" encoding="utf-8"?>
+<p:sld xmlns:a="http://schemas.openxmlformats.org/drawingml/2006/main" xmlns:r="http://schemas.openxmlformats.org/officeDocument/2006/relationships" xmlns:p="http://schemas.openxmlformats.org/presentationml/2006/main">
+  <p:cSld>
+    <p:spTree>
+      <p:nvGrpSpPr>
+        <p:cNvPr id="1" name=""/>
+        <p:cNvGrpSpPr/>
+        <p:nvPr/>
+      </p:nvGrpSpPr>
+      <p:grpSpPr>
+        <a:xfrm>
+          <a:off x="0" y="0"/>
+          <a:ext cx="0" cy="0"/>
+          <a:chOff x="0" y="0"/>
+          <a:chExt cx="0" cy="0"/>
+        </a:xfrm>
+      </p:grpSpPr>
+      <p:sp>
+        <p:nvSpPr>
+          <p:cNvPr id="2" name="Title 1">
+            <a:extLst>
+              <a:ext uri="{FF2B5EF4-FFF2-40B4-BE49-F238E27FC236}">
                 <a16:creationId xmlns:a16="http://schemas.microsoft.com/office/drawing/2014/main" id="{08DAE5D2-8A3D-410C-9FF2-30F57991BB0A}"/>
               </a:ext>
             </a:extLst>
@@ -12572,7 +12747,7 @@
 </p:sld>
 </file>
 
-<file path=ppt/slides/slide11.xml><?xml version="1.0" encoding="utf-8"?>
+<file path=ppt/slides/slide12.xml><?xml version="1.0" encoding="utf-8"?>
 <p:sld xmlns:a="http://schemas.openxmlformats.org/drawingml/2006/main" xmlns:r="http://schemas.openxmlformats.org/officeDocument/2006/relationships" xmlns:p="http://schemas.openxmlformats.org/presentationml/2006/main">
   <p:cSld>
     <p:spTree>
@@ -12635,7 +12810,7 @@
 </p:sld>
 </file>
 
-<file path=ppt/slides/slide12.xml><?xml version="1.0" encoding="utf-8"?>
+<file path=ppt/slides/slide13.xml><?xml version="1.0" encoding="utf-8"?>
 <p:sld xmlns:a="http://schemas.openxmlformats.org/drawingml/2006/main" xmlns:r="http://schemas.openxmlformats.org/officeDocument/2006/relationships" xmlns:p="http://schemas.openxmlformats.org/presentationml/2006/main">
   <p:cSld>
     <p:spTree>
@@ -12962,7 +13137,7 @@
         </p:spPr>
         <p:txBody>
           <a:bodyPr>
-            <a:normAutofit lnSpcReduction="10000"/>
+            <a:normAutofit/>
           </a:bodyPr>
           <a:lstStyle/>
           <a:p>
@@ -12980,13 +13155,6 @@
               <a:t>https://www.microsoft.com/net/core</a:t>
             </a:r>
             <a:endParaRPr lang="en-US" dirty="0"/>
-          </a:p>
-          <a:p>
-            <a:pPr lvl="2"/>
-            <a:r>
-              <a:rPr lang="en-US" dirty="0"/>
-              <a:t>Native packages for Windows, Mac OS X and RHEL/Ubuntu/Debian/Fedora/CentOS</a:t>
-            </a:r>
           </a:p>
           <a:p>
             <a:r>
@@ -13074,6 +13242,159 @@
           <p:cNvPr id="2" name="Title 1">
             <a:extLst>
               <a:ext uri="{FF2B5EF4-FFF2-40B4-BE49-F238E27FC236}">
+                <a16:creationId xmlns:a16="http://schemas.microsoft.com/office/drawing/2014/main" id="{0AF7B211-8A75-4B00-93A1-9ABF3FA8500E}"/>
+              </a:ext>
+            </a:extLst>
+          </p:cNvPr>
+          <p:cNvSpPr>
+            <a:spLocks noGrp="1"/>
+          </p:cNvSpPr>
+          <p:nvPr>
+            <p:ph type="title"/>
+          </p:nvPr>
+        </p:nvSpPr>
+        <p:spPr/>
+        <p:txBody>
+          <a:bodyPr/>
+          <a:lstStyle/>
+          <a:p>
+            <a:r>
+              <a:rPr lang="en-US" dirty="0"/>
+              <a:t>Wait… so…what is </a:t>
+            </a:r>
+            <a:r>
+              <a:rPr lang="en-US" dirty="0" err="1"/>
+              <a:t>.net</a:t>
+            </a:r>
+            <a:r>
+              <a:rPr lang="en-US" dirty="0"/>
+              <a:t> core?</a:t>
+            </a:r>
+          </a:p>
+        </p:txBody>
+      </p:sp>
+      <p:sp>
+        <p:nvSpPr>
+          <p:cNvPr id="3" name="Content Placeholder 2">
+            <a:extLst>
+              <a:ext uri="{FF2B5EF4-FFF2-40B4-BE49-F238E27FC236}">
+                <a16:creationId xmlns:a16="http://schemas.microsoft.com/office/drawing/2014/main" id="{C0268229-D984-4D4A-A5F9-7532DDB05F2A}"/>
+              </a:ext>
+            </a:extLst>
+          </p:cNvPr>
+          <p:cNvSpPr>
+            <a:spLocks noGrp="1"/>
+          </p:cNvSpPr>
+          <p:nvPr>
+            <p:ph idx="1"/>
+          </p:nvPr>
+        </p:nvSpPr>
+        <p:spPr>
+          <a:xfrm>
+            <a:off x="1141412" y="1591871"/>
+            <a:ext cx="9905999" cy="3541714"/>
+          </a:xfrm>
+        </p:spPr>
+        <p:txBody>
+          <a:bodyPr>
+            <a:normAutofit fontScale="85000" lnSpcReduction="20000"/>
+          </a:bodyPr>
+          <a:lstStyle/>
+          <a:p>
+            <a:r>
+              <a:rPr lang="en-US" dirty="0"/>
+              <a:t>Cross-platform version of the .NET Framework</a:t>
+            </a:r>
+          </a:p>
+          <a:p>
+            <a:r>
+              <a:rPr lang="en-US" dirty="0"/>
+              <a:t>Officially supported on Linux (x86/x64/ARM32), Mac OS X, Windows (x86/x64/ARM32), </a:t>
+            </a:r>
+            <a:r>
+              <a:rPr lang="en-US" dirty="0" err="1"/>
+              <a:t>Tizen</a:t>
+            </a:r>
+            <a:r>
+              <a:rPr lang="en-US" dirty="0"/>
+              <a:t> (ARM32)</a:t>
+            </a:r>
+          </a:p>
+          <a:p>
+            <a:r>
+              <a:rPr lang="en-US" dirty="0"/>
+              <a:t>Command Line Applications, Libraries and Web Applications Supported</a:t>
+            </a:r>
+          </a:p>
+          <a:p>
+            <a:pPr lvl="1"/>
+            <a:r>
+              <a:rPr lang="en-US" dirty="0"/>
+              <a:t>GUI Frameworks are coming later this year</a:t>
+            </a:r>
+          </a:p>
+          <a:p>
+            <a:r>
+              <a:rPr lang="en-US" dirty="0"/>
+              <a:t>Faster in a lot scenarios compared to .NET 4.7</a:t>
+            </a:r>
+          </a:p>
+          <a:p>
+            <a:pPr lvl="1"/>
+            <a:r>
+              <a:rPr lang="en-US" dirty="0">
+                <a:hlinkClick r:id="rId2"/>
+              </a:rPr>
+              <a:t>https://blogs.msdn.microsoft.com/dotnet/2017/06/07/performance-improvements-in-net-core/</a:t>
+            </a:r>
+            <a:endParaRPr lang="en-US" dirty="0"/>
+          </a:p>
+          <a:p>
+            <a:r>
+              <a:rPr lang="en-US" dirty="0"/>
+              <a:t>Uses Platform Native libraries for SHA256 Hashing (CNG on Windows, OpenSSL on Mac OS X/Linux)</a:t>
+            </a:r>
+          </a:p>
+          <a:p>
+            <a:endParaRPr lang="en-US" dirty="0"/>
+          </a:p>
+        </p:txBody>
+      </p:sp>
+    </p:spTree>
+    <p:extLst>
+      <p:ext uri="{BB962C8B-B14F-4D97-AF65-F5344CB8AC3E}">
+        <p14:creationId xmlns:p14="http://schemas.microsoft.com/office/powerpoint/2010/main" val="3960363236"/>
+      </p:ext>
+    </p:extLst>
+  </p:cSld>
+  <p:clrMapOvr>
+    <a:masterClrMapping/>
+  </p:clrMapOvr>
+</p:sld>
+</file>
+
+<file path=ppt/slides/slide5.xml><?xml version="1.0" encoding="utf-8"?>
+<p:sld xmlns:a="http://schemas.openxmlformats.org/drawingml/2006/main" xmlns:r="http://schemas.openxmlformats.org/officeDocument/2006/relationships" xmlns:p="http://schemas.openxmlformats.org/presentationml/2006/main">
+  <p:cSld>
+    <p:spTree>
+      <p:nvGrpSpPr>
+        <p:cNvPr id="1" name=""/>
+        <p:cNvGrpSpPr/>
+        <p:nvPr/>
+      </p:nvGrpSpPr>
+      <p:grpSpPr>
+        <a:xfrm>
+          <a:off x="0" y="0"/>
+          <a:ext cx="0" cy="0"/>
+          <a:chOff x="0" y="0"/>
+          <a:chExt cx="0" cy="0"/>
+        </a:xfrm>
+      </p:grpSpPr>
+      <p:sp>
+        <p:nvSpPr>
+          <p:cNvPr id="2" name="Title 1">
+            <a:extLst>
+              <a:ext uri="{FF2B5EF4-FFF2-40B4-BE49-F238E27FC236}">
                 <a16:creationId xmlns:a16="http://schemas.microsoft.com/office/drawing/2014/main" id="{B80F3491-1279-4DE7-ACBE-126A73A2472B}"/>
               </a:ext>
             </a:extLst>
@@ -13232,7 +13553,7 @@
 </p:sld>
 </file>
 
-<file path=ppt/slides/slide5.xml><?xml version="1.0" encoding="utf-8"?>
+<file path=ppt/slides/slide6.xml><?xml version="1.0" encoding="utf-8"?>
 <p:sld xmlns:a="http://schemas.openxmlformats.org/drawingml/2006/main" xmlns:r="http://schemas.openxmlformats.org/officeDocument/2006/relationships" xmlns:p="http://schemas.openxmlformats.org/presentationml/2006/main">
   <p:cSld>
     <p:spTree>
@@ -13295,7 +13616,7 @@
 </p:sld>
 </file>
 
-<file path=ppt/slides/slide6.xml><?xml version="1.0" encoding="utf-8"?>
+<file path=ppt/slides/slide7.xml><?xml version="1.0" encoding="utf-8"?>
 <p:sld xmlns:a="http://schemas.openxmlformats.org/drawingml/2006/main" xmlns:r="http://schemas.openxmlformats.org/officeDocument/2006/relationships" xmlns:p="http://schemas.openxmlformats.org/presentationml/2006/main">
   <p:cSld>
     <p:spTree>
@@ -13461,7 +13782,7 @@
 </p:sld>
 </file>
 
-<file path=ppt/slides/slide7.xml><?xml version="1.0" encoding="utf-8"?>
+<file path=ppt/slides/slide8.xml><?xml version="1.0" encoding="utf-8"?>
 <p:sld xmlns:a="http://schemas.openxmlformats.org/drawingml/2006/main" xmlns:r="http://schemas.openxmlformats.org/officeDocument/2006/relationships" xmlns:p="http://schemas.openxmlformats.org/presentationml/2006/main">
   <p:cSld>
     <p:spTree>
@@ -13682,7 +14003,7 @@
 </p:sld>
 </file>
 
-<file path=ppt/slides/slide8.xml><?xml version="1.0" encoding="utf-8"?>
+<file path=ppt/slides/slide9.xml><?xml version="1.0" encoding="utf-8"?>
 <p:sld xmlns:a="http://schemas.openxmlformats.org/drawingml/2006/main" xmlns:r="http://schemas.openxmlformats.org/officeDocument/2006/relationships" xmlns:p="http://schemas.openxmlformats.org/presentationml/2006/main">
   <p:cSld>
     <p:spTree>
@@ -13873,171 +14194,6 @@
     <p:extLst>
       <p:ext uri="{BB962C8B-B14F-4D97-AF65-F5344CB8AC3E}">
         <p14:creationId xmlns:p14="http://schemas.microsoft.com/office/powerpoint/2010/main" val="3157970185"/>
-      </p:ext>
-    </p:extLst>
-  </p:cSld>
-  <p:clrMapOvr>
-    <a:masterClrMapping/>
-  </p:clrMapOvr>
-</p:sld>
-</file>
-
-<file path=ppt/slides/slide9.xml><?xml version="1.0" encoding="utf-8"?>
-<p:sld xmlns:a="http://schemas.openxmlformats.org/drawingml/2006/main" xmlns:r="http://schemas.openxmlformats.org/officeDocument/2006/relationships" xmlns:p="http://schemas.openxmlformats.org/presentationml/2006/main">
-  <p:cSld>
-    <p:spTree>
-      <p:nvGrpSpPr>
-        <p:cNvPr id="1" name=""/>
-        <p:cNvGrpSpPr/>
-        <p:nvPr/>
-      </p:nvGrpSpPr>
-      <p:grpSpPr>
-        <a:xfrm>
-          <a:off x="0" y="0"/>
-          <a:ext cx="0" cy="0"/>
-          <a:chOff x="0" y="0"/>
-          <a:chExt cx="0" cy="0"/>
-        </a:xfrm>
-      </p:grpSpPr>
-      <p:sp>
-        <p:nvSpPr>
-          <p:cNvPr id="2" name="Title 1">
-            <a:extLst>
-              <a:ext uri="{FF2B5EF4-FFF2-40B4-BE49-F238E27FC236}">
-                <a16:creationId xmlns:a16="http://schemas.microsoft.com/office/drawing/2014/main" id="{8B80F38C-6943-40B9-BF2F-D669E11FB010}"/>
-              </a:ext>
-            </a:extLst>
-          </p:cNvPr>
-          <p:cNvSpPr>
-            <a:spLocks noGrp="1"/>
-          </p:cNvSpPr>
-          <p:nvPr>
-            <p:ph type="title"/>
-          </p:nvPr>
-        </p:nvSpPr>
-        <p:spPr/>
-        <p:txBody>
-          <a:bodyPr/>
-          <a:lstStyle/>
-          <a:p>
-            <a:r>
-              <a:rPr lang="en-US" dirty="0"/>
-              <a:t>Functions as parameters</a:t>
-            </a:r>
-          </a:p>
-        </p:txBody>
-      </p:sp>
-      <p:sp>
-        <p:nvSpPr>
-          <p:cNvPr id="3" name="Content Placeholder 2">
-            <a:extLst>
-              <a:ext uri="{FF2B5EF4-FFF2-40B4-BE49-F238E27FC236}">
-                <a16:creationId xmlns:a16="http://schemas.microsoft.com/office/drawing/2014/main" id="{33232CF6-83D9-4844-8C9B-7B12E226CD5C}"/>
-              </a:ext>
-            </a:extLst>
-          </p:cNvPr>
-          <p:cNvSpPr>
-            <a:spLocks noGrp="1"/>
-          </p:cNvSpPr>
-          <p:nvPr>
-            <p:ph idx="1"/>
-          </p:nvPr>
-        </p:nvSpPr>
-        <p:spPr/>
-        <p:txBody>
-          <a:bodyPr/>
-          <a:lstStyle/>
-          <a:p>
-            <a:r>
-              <a:rPr lang="en-US" dirty="0"/>
-              <a:t>Utilized with Extension Methods promotes code reuse and readability</a:t>
-            </a:r>
-          </a:p>
-          <a:p>
-            <a:r>
-              <a:rPr lang="en-US" dirty="0"/>
-              <a:t>Example:</a:t>
-            </a:r>
-          </a:p>
-          <a:p>
-            <a:pPr marL="457200" lvl="1" indent="0">
-              <a:buNone/>
-            </a:pPr>
-            <a:r>
-              <a:rPr lang="en-US" dirty="0"/>
-              <a:t>public static bool </a:t>
-            </a:r>
-            <a:r>
-              <a:rPr lang="en-US" dirty="0" err="1"/>
-              <a:t>IsTrue</a:t>
-            </a:r>
-            <a:r>
-              <a:rPr lang="en-US" dirty="0"/>
-              <a:t>&lt;T&gt;(this T </a:t>
-            </a:r>
-            <a:r>
-              <a:rPr lang="en-US" dirty="0" err="1"/>
-              <a:t>genericObject</a:t>
-            </a:r>
-            <a:r>
-              <a:rPr lang="en-US" dirty="0"/>
-              <a:t>, Predicate&lt;T&gt; condition) =&gt; condition(</a:t>
-            </a:r>
-            <a:r>
-              <a:rPr lang="en-US" dirty="0" err="1"/>
-              <a:t>genericObject</a:t>
-            </a:r>
-            <a:r>
-              <a:rPr lang="en-US" dirty="0"/>
-              <a:t>);</a:t>
-            </a:r>
-          </a:p>
-          <a:p>
-            <a:pPr marL="457200" lvl="1" indent="0">
-              <a:buNone/>
-            </a:pPr>
-            <a:endParaRPr lang="en-US" dirty="0"/>
-          </a:p>
-          <a:p>
-            <a:pPr marL="457200" lvl="1" indent="0">
-              <a:buNone/>
-            </a:pPr>
-            <a:r>
-              <a:rPr lang="en-US" dirty="0" err="1"/>
-              <a:t>var</a:t>
-            </a:r>
-            <a:r>
-              <a:rPr lang="en-US" dirty="0"/>
-              <a:t> person = new Person(name: “John”, age: 32);</a:t>
-            </a:r>
-          </a:p>
-          <a:p>
-            <a:pPr marL="457200" lvl="1" indent="0">
-              <a:buNone/>
-            </a:pPr>
-            <a:r>
-              <a:rPr lang="en-US" dirty="0" err="1"/>
-              <a:t>person.IsTrue</a:t>
-            </a:r>
-            <a:r>
-              <a:rPr lang="en-US" dirty="0"/>
-              <a:t>(a =&gt; </a:t>
-            </a:r>
-            <a:r>
-              <a:rPr lang="en-US" dirty="0" err="1"/>
-              <a:t>a.Age</a:t>
-            </a:r>
-            <a:r>
-              <a:rPr lang="en-US" dirty="0"/>
-              <a:t> &gt; 50); </a:t>
-            </a:r>
-          </a:p>
-        </p:txBody>
-      </p:sp>
-    </p:spTree>
-    <p:extLst>
-      <p:ext uri="{BB962C8B-B14F-4D97-AF65-F5344CB8AC3E}">
-        <p14:creationId xmlns:p14="http://schemas.microsoft.com/office/powerpoint/2010/main" val="4017039949"/>
       </p:ext>
     </p:extLst>
   </p:cSld>

</xml_diff>